<commit_message>
COMP270: fixes for week 3 slides and week 4 workshop/seminar
</commit_message>
<xml_diff>
--- a/COMP270/03/2020-21-COMP270-03-lecture-materials-1.pptx
+++ b/COMP270/03/2020-21-COMP270-03-lecture-materials-1.pptx
@@ -257,7 +257,7 @@
           <a:p>
             <a:fld id="{8906F081-8781-4431-8FD4-2CF608CD7C47}" type="datetimeFigureOut">
               <a:rPr lang="en-US" smtClean="0"/>
-              <a:t>9/4/2020</a:t>
+              <a:t>10/4/2020</a:t>
             </a:fld>
             <a:endParaRPr lang="en-US"/>
           </a:p>
@@ -422,7 +422,7 @@
           <a:p>
             <a:fld id="{F06CA47C-B7FD-4BE9-B0E6-81BA758D95F2}" type="datetimeFigureOut">
               <a:rPr lang="en-US" smtClean="0"/>
-              <a:t>9/4/2020</a:t>
+              <a:t>10/4/2020</a:t>
             </a:fld>
             <a:endParaRPr lang="en-US"/>
           </a:p>
@@ -2316,7 +2316,7 @@
           <a:p>
             <a:fld id="{33024136-D290-48F3-A182-4C46BEB5146B}" type="datetime1">
               <a:rPr lang="en-US" smtClean="0"/>
-              <a:t>9/4/2020</a:t>
+              <a:t>10/4/2020</a:t>
             </a:fld>
             <a:endParaRPr lang="en-US" dirty="0"/>
           </a:p>
@@ -2500,7 +2500,7 @@
           <a:p>
             <a:fld id="{9CC7D44C-38B1-4D0F-9006-D5774F331095}" type="datetime1">
               <a:rPr lang="en-US" smtClean="0"/>
-              <a:t>9/4/2020</a:t>
+              <a:t>10/4/2020</a:t>
             </a:fld>
             <a:endParaRPr lang="en-US"/>
           </a:p>
@@ -2694,7 +2694,7 @@
           <a:p>
             <a:fld id="{F98D518A-FD4F-4358-B95B-9DB5A17160FB}" type="datetime1">
               <a:rPr lang="en-US" smtClean="0"/>
-              <a:t>9/4/2020</a:t>
+              <a:t>10/4/2020</a:t>
             </a:fld>
             <a:endParaRPr lang="en-US"/>
           </a:p>
@@ -2887,7 +2887,7 @@
           <a:p>
             <a:fld id="{5E2A9F4F-03AD-4497-A65D-076601BD41D2}" type="datetime1">
               <a:rPr lang="en-US" smtClean="0"/>
-              <a:t>9/4/2020</a:t>
+              <a:t>10/4/2020</a:t>
             </a:fld>
             <a:endParaRPr lang="en-US"/>
           </a:p>
@@ -3110,7 +3110,7 @@
           <a:p>
             <a:fld id="{EDFBF3AC-A781-43AA-8BD5-B12F49168B94}" type="datetime1">
               <a:rPr lang="en-US" smtClean="0"/>
-              <a:t>9/4/2020</a:t>
+              <a:t>10/4/2020</a:t>
             </a:fld>
             <a:endParaRPr lang="en-US"/>
           </a:p>
@@ -3395,7 +3395,7 @@
           <a:p>
             <a:fld id="{C5256A41-C91B-43FF-9881-F5DA9878418F}" type="datetime1">
               <a:rPr lang="en-US" smtClean="0"/>
-              <a:t>9/4/2020</a:t>
+              <a:t>10/4/2020</a:t>
             </a:fld>
             <a:endParaRPr lang="en-US"/>
           </a:p>
@@ -3798,7 +3798,7 @@
           <a:p>
             <a:fld id="{FFD7AA76-41EE-4C13-950E-E611B8B8FC52}" type="datetime1">
               <a:rPr lang="en-US" smtClean="0"/>
-              <a:t>9/4/2020</a:t>
+              <a:t>10/4/2020</a:t>
             </a:fld>
             <a:endParaRPr lang="en-US"/>
           </a:p>
@@ -3945,7 +3945,7 @@
           <a:p>
             <a:fld id="{89407A26-E7BC-4498-97E4-87AF12377CA9}" type="datetime1">
               <a:rPr lang="en-US" smtClean="0"/>
-              <a:t>9/4/2020</a:t>
+              <a:t>10/4/2020</a:t>
             </a:fld>
             <a:endParaRPr lang="en-US"/>
           </a:p>
@@ -4060,7 +4060,7 @@
           <a:p>
             <a:fld id="{93EA4171-1117-4486-993C-35A7470D8847}" type="datetime1">
               <a:rPr lang="en-US" smtClean="0"/>
-              <a:t>9/4/2020</a:t>
+              <a:t>10/4/2020</a:t>
             </a:fld>
             <a:endParaRPr lang="en-US"/>
           </a:p>
@@ -4332,7 +4332,7 @@
           <a:p>
             <a:fld id="{472A4CB8-1563-4663-81DB-74EB416C19BE}" type="datetime1">
               <a:rPr lang="en-US" smtClean="0"/>
-              <a:t>9/4/2020</a:t>
+              <a:t>10/4/2020</a:t>
             </a:fld>
             <a:endParaRPr lang="en-US"/>
           </a:p>
@@ -4668,7 +4668,7 @@
           <a:p>
             <a:fld id="{0C6724CE-2468-448B-87C1-A92EDD78369B}" type="datetime1">
               <a:rPr lang="en-US" smtClean="0"/>
-              <a:t>9/4/2020</a:t>
+              <a:t>10/4/2020</a:t>
             </a:fld>
             <a:endParaRPr lang="en-US"/>
           </a:p>
@@ -4929,7 +4929,7 @@
           <a:p>
             <a:fld id="{4CD11720-76E7-46E6-B0AA-057287C42052}" type="datetime1">
               <a:rPr lang="en-US" smtClean="0"/>
-              <a:t>9/4/2020</a:t>
+              <a:t>10/4/2020</a:t>
             </a:fld>
             <a:endParaRPr lang="en-US" dirty="0"/>
           </a:p>
@@ -8004,8 +8004,8 @@
             </a:fontRef>
           </p:style>
         </p:cxnSp>
-        <mc:AlternateContent xmlns:mc="http://schemas.openxmlformats.org/markup-compatibility/2006">
-          <mc:Choice xmlns:a14="http://schemas.microsoft.com/office/drawing/2010/main" Requires="a14">
+        <mc:AlternateContent xmlns:mc="http://schemas.openxmlformats.org/markup-compatibility/2006" xmlns:a14="http://schemas.microsoft.com/office/drawing/2010/main">
+          <mc:Choice Requires="a14">
             <p:sp>
               <p:nvSpPr>
                 <p:cNvPr id="7" name="TextBox 6">
@@ -8090,7 +8090,7 @@
               </p:txBody>
             </p:sp>
           </mc:Choice>
-          <mc:Fallback>
+          <mc:Fallback xmlns="">
             <p:sp>
               <p:nvSpPr>
                 <p:cNvPr id="7" name="TextBox 6">
@@ -9412,8 +9412,8 @@
           </a:p>
         </p:txBody>
       </p:sp>
-      <mc:AlternateContent xmlns:mc="http://schemas.openxmlformats.org/markup-compatibility/2006" xmlns:a14="http://schemas.microsoft.com/office/drawing/2010/main">
-        <mc:Choice Requires="a14">
+      <mc:AlternateContent xmlns:mc="http://schemas.openxmlformats.org/markup-compatibility/2006">
+        <mc:Choice xmlns:a14="http://schemas.microsoft.com/office/drawing/2010/main" Requires="a14">
           <p:sp>
             <p:nvSpPr>
               <p:cNvPr id="3" name="Content Placeholder 2">
@@ -10404,10 +10404,10 @@
                                   </m:fPr>
                                   <m:num>
                                     <m:r>
-                                      <a:rPr lang="en-GB" b="0" i="1">
+                                      <a:rPr lang="en-GB" b="0" i="1" smtClean="0">
                                         <a:latin typeface="Cambria Math" panose="02040503050406030204" pitchFamily="18" charset="0"/>
                                       </a:rPr>
-                                      <m:t>𝑥</m:t>
+                                      <m:t>𝑦</m:t>
                                     </m:r>
                                   </m:num>
                                   <m:den>
@@ -10738,7 +10738,7 @@
             </p:txBody>
           </p:sp>
         </mc:Choice>
-        <mc:Fallback xmlns="">
+        <mc:Fallback>
           <p:sp>
             <p:nvSpPr>
               <p:cNvPr id="3" name="Content Placeholder 2">
@@ -10937,8 +10937,8 @@
           </p:sp>
         </mc:Fallback>
       </mc:AlternateContent>
-      <mc:AlternateContent xmlns:mc="http://schemas.openxmlformats.org/markup-compatibility/2006">
-        <mc:Choice xmlns:a14="http://schemas.microsoft.com/office/drawing/2010/main" Requires="a14">
+      <mc:AlternateContent xmlns:mc="http://schemas.openxmlformats.org/markup-compatibility/2006" xmlns:a14="http://schemas.microsoft.com/office/drawing/2010/main">
+        <mc:Choice Requires="a14">
           <p:sp>
             <p:nvSpPr>
               <p:cNvPr id="6" name="Cloud 5" descr="Finding 𝐯 ̂ is known as normalisation; often performed by functions normalize() (in-place) and normalized() (returns 𝐯 ̂ keeping 𝐯 intact).">
@@ -11117,7 +11117,7 @@
             </p:txBody>
           </p:sp>
         </mc:Choice>
-        <mc:Fallback>
+        <mc:Fallback xmlns="">
           <p:sp>
             <p:nvSpPr>
               <p:cNvPr id="6" name="Cloud 5" descr="Finding 𝐯 ̂ is known as normalisation; often performed by functions normalize() (in-place) and normalized() (returns 𝐯 ̂ keeping 𝐯 intact).">
@@ -11351,33 +11351,15 @@
                                   </p:childTnLst>
                                 </p:cTn>
                               </p:par>
-                            </p:childTnLst>
-                          </p:cTn>
-                        </p:par>
-                      </p:childTnLst>
-                    </p:cTn>
-                  </p:par>
-                  <p:par>
-                    <p:cTn id="16" fill="hold">
-                      <p:stCondLst>
-                        <p:cond delay="indefinite"/>
-                      </p:stCondLst>
-                      <p:childTnLst>
-                        <p:par>
-                          <p:cTn id="17" fill="hold">
-                            <p:stCondLst>
-                              <p:cond delay="0"/>
-                            </p:stCondLst>
-                            <p:childTnLst>
                               <p:par>
-                                <p:cTn id="18" presetID="10" presetClass="entr" presetSubtype="0" fill="hold" grpId="0" nodeType="clickEffect">
+                                <p:cTn id="16" presetID="10" presetClass="entr" presetSubtype="0" fill="hold" grpId="0" nodeType="withEffect">
                                   <p:stCondLst>
                                     <p:cond delay="0"/>
                                   </p:stCondLst>
                                   <p:childTnLst>
                                     <p:set>
                                       <p:cBhvr>
-                                        <p:cTn id="19" dur="1" fill="hold">
+                                        <p:cTn id="17" dur="1" fill="hold">
                                           <p:stCondLst>
                                             <p:cond delay="0"/>
                                           </p:stCondLst>
@@ -11399,7 +11381,7 @@
                                     </p:set>
                                     <p:animEffect transition="in" filter="fade">
                                       <p:cBhvr>
-                                        <p:cTn id="20" dur="500"/>
+                                        <p:cTn id="18" dur="500"/>
                                         <p:tgtEl>
                                           <p:spTgt spid="3">
                                             <p:txEl>
@@ -11412,33 +11394,15 @@
                                   </p:childTnLst>
                                 </p:cTn>
                               </p:par>
-                            </p:childTnLst>
-                          </p:cTn>
-                        </p:par>
-                      </p:childTnLst>
-                    </p:cTn>
-                  </p:par>
-                  <p:par>
-                    <p:cTn id="21" fill="hold">
-                      <p:stCondLst>
-                        <p:cond delay="indefinite"/>
-                      </p:stCondLst>
-                      <p:childTnLst>
-                        <p:par>
-                          <p:cTn id="22" fill="hold">
-                            <p:stCondLst>
-                              <p:cond delay="0"/>
-                            </p:stCondLst>
-                            <p:childTnLst>
                               <p:par>
-                                <p:cTn id="23" presetID="10" presetClass="entr" presetSubtype="0" fill="hold" grpId="0" nodeType="clickEffect">
+                                <p:cTn id="19" presetID="10" presetClass="entr" presetSubtype="0" fill="hold" grpId="0" nodeType="withEffect">
                                   <p:stCondLst>
                                     <p:cond delay="0"/>
                                   </p:stCondLst>
                                   <p:childTnLst>
                                     <p:set>
                                       <p:cBhvr>
-                                        <p:cTn id="24" dur="1" fill="hold">
+                                        <p:cTn id="20" dur="1" fill="hold">
                                           <p:stCondLst>
                                             <p:cond delay="0"/>
                                           </p:stCondLst>
@@ -11460,7 +11424,7 @@
                                     </p:set>
                                     <p:animEffect transition="in" filter="fade">
                                       <p:cBhvr>
-                                        <p:cTn id="25" dur="500"/>
+                                        <p:cTn id="21" dur="500"/>
                                         <p:tgtEl>
                                           <p:spTgt spid="3">
                                             <p:txEl>
@@ -11473,33 +11437,15 @@
                                   </p:childTnLst>
                                 </p:cTn>
                               </p:par>
-                            </p:childTnLst>
-                          </p:cTn>
-                        </p:par>
-                      </p:childTnLst>
-                    </p:cTn>
-                  </p:par>
-                  <p:par>
-                    <p:cTn id="26" fill="hold">
-                      <p:stCondLst>
-                        <p:cond delay="indefinite"/>
-                      </p:stCondLst>
-                      <p:childTnLst>
-                        <p:par>
-                          <p:cTn id="27" fill="hold">
-                            <p:stCondLst>
-                              <p:cond delay="0"/>
-                            </p:stCondLst>
-                            <p:childTnLst>
                               <p:par>
-                                <p:cTn id="28" presetID="10" presetClass="entr" presetSubtype="0" fill="hold" grpId="0" nodeType="clickEffect">
+                                <p:cTn id="22" presetID="10" presetClass="entr" presetSubtype="0" fill="hold" grpId="0" nodeType="withEffect">
                                   <p:stCondLst>
                                     <p:cond delay="0"/>
                                   </p:stCondLst>
                                   <p:childTnLst>
                                     <p:set>
                                       <p:cBhvr>
-                                        <p:cTn id="29" dur="1" fill="hold">
+                                        <p:cTn id="23" dur="1" fill="hold">
                                           <p:stCondLst>
                                             <p:cond delay="0"/>
                                           </p:stCondLst>
@@ -11521,7 +11467,7 @@
                                     </p:set>
                                     <p:animEffect transition="in" filter="fade">
                                       <p:cBhvr>
-                                        <p:cTn id="30" dur="500"/>
+                                        <p:cTn id="24" dur="500"/>
                                         <p:tgtEl>
                                           <p:spTgt spid="3">
                                             <p:txEl>
@@ -11535,14 +11481,14 @@
                                 </p:cTn>
                               </p:par>
                               <p:par>
-                                <p:cTn id="31" presetID="10" presetClass="entr" presetSubtype="0" fill="hold" grpId="0" nodeType="withEffect">
+                                <p:cTn id="25" presetID="10" presetClass="entr" presetSubtype="0" fill="hold" grpId="0" nodeType="withEffect">
                                   <p:stCondLst>
                                     <p:cond delay="0"/>
                                   </p:stCondLst>
                                   <p:childTnLst>
                                     <p:set>
                                       <p:cBhvr>
-                                        <p:cTn id="32" dur="1" fill="hold">
+                                        <p:cTn id="26" dur="1" fill="hold">
                                           <p:stCondLst>
                                             <p:cond delay="0"/>
                                           </p:stCondLst>
@@ -11560,7 +11506,7 @@
                                     </p:set>
                                     <p:animEffect transition="in" filter="fade">
                                       <p:cBhvr>
-                                        <p:cTn id="33" dur="500"/>
+                                        <p:cTn id="27" dur="500"/>
                                         <p:tgtEl>
                                           <p:spTgt spid="4"/>
                                         </p:tgtEl>
@@ -11576,26 +11522,26 @@
                     </p:cTn>
                   </p:par>
                   <p:par>
-                    <p:cTn id="34" fill="hold">
+                    <p:cTn id="28" fill="hold">
                       <p:stCondLst>
                         <p:cond delay="indefinite"/>
                       </p:stCondLst>
                       <p:childTnLst>
                         <p:par>
-                          <p:cTn id="35" fill="hold">
+                          <p:cTn id="29" fill="hold">
                             <p:stCondLst>
                               <p:cond delay="0"/>
                             </p:stCondLst>
                             <p:childTnLst>
                               <p:par>
-                                <p:cTn id="36" presetID="10" presetClass="entr" presetSubtype="0" fill="hold" grpId="0" nodeType="clickEffect">
+                                <p:cTn id="30" presetID="10" presetClass="entr" presetSubtype="0" fill="hold" grpId="0" nodeType="clickEffect">
                                   <p:stCondLst>
                                     <p:cond delay="0"/>
                                   </p:stCondLst>
                                   <p:childTnLst>
                                     <p:set>
                                       <p:cBhvr>
-                                        <p:cTn id="37" dur="1" fill="hold">
+                                        <p:cTn id="31" dur="1" fill="hold">
                                           <p:stCondLst>
                                             <p:cond delay="0"/>
                                           </p:stCondLst>
@@ -11613,7 +11559,7 @@
                                     </p:set>
                                     <p:animEffect transition="in" filter="fade">
                                       <p:cBhvr>
-                                        <p:cTn id="38" dur="500"/>
+                                        <p:cTn id="32" dur="500"/>
                                         <p:tgtEl>
                                           <p:spTgt spid="6"/>
                                         </p:tgtEl>
@@ -12745,8 +12691,8 @@
             </a:fontRef>
           </p:style>
         </p:cxnSp>
-        <mc:AlternateContent xmlns:mc="http://schemas.openxmlformats.org/markup-compatibility/2006">
-          <mc:Choice xmlns:a14="http://schemas.microsoft.com/office/drawing/2010/main" Requires="a14">
+        <mc:AlternateContent xmlns:mc="http://schemas.openxmlformats.org/markup-compatibility/2006" xmlns:a14="http://schemas.microsoft.com/office/drawing/2010/main">
+          <mc:Choice Requires="a14">
             <p:sp>
               <p:nvSpPr>
                 <p:cNvPr id="15" name="TextBox 14">
@@ -12812,7 +12758,7 @@
               </p:txBody>
             </p:sp>
           </mc:Choice>
-          <mc:Fallback>
+          <mc:Fallback xmlns="">
             <p:sp>
               <p:nvSpPr>
                 <p:cNvPr id="15" name="TextBox 14">
@@ -12884,8 +12830,8 @@
             <a:chExt cx="2471500" cy="2412808"/>
           </a:xfrm>
         </p:grpSpPr>
-        <mc:AlternateContent xmlns:mc="http://schemas.openxmlformats.org/markup-compatibility/2006">
-          <mc:Choice xmlns:a14="http://schemas.microsoft.com/office/drawing/2010/main" Requires="a14">
+        <mc:AlternateContent xmlns:mc="http://schemas.openxmlformats.org/markup-compatibility/2006" xmlns:a14="http://schemas.microsoft.com/office/drawing/2010/main">
+          <mc:Choice Requires="a14">
             <p:sp>
               <p:nvSpPr>
                 <p:cNvPr id="19" name="TextBox 18">
@@ -13033,7 +12979,7 @@
               </p:txBody>
             </p:sp>
           </mc:Choice>
-          <mc:Fallback>
+          <mc:Fallback xmlns="">
             <p:sp>
               <p:nvSpPr>
                 <p:cNvPr id="19" name="TextBox 18">
@@ -16158,7 +16104,7 @@
                                       </a:solidFill>
                                       <a:latin typeface="Cambria Math" panose="02040503050406030204" pitchFamily="18" charset="0"/>
                                     </a:rPr>
-                                    <m:t>2</m:t>
+                                    <m:t>1</m:t>
                                   </m:r>
                                 </m:sub>
                               </m:sSub>
@@ -19580,8 +19526,8 @@
             </p:sp>
           </mc:Fallback>
         </mc:AlternateContent>
-        <mc:AlternateContent xmlns:mc="http://schemas.openxmlformats.org/markup-compatibility/2006">
-          <mc:Choice xmlns:a14="http://schemas.microsoft.com/office/drawing/2010/main" Requires="a14">
+        <mc:AlternateContent xmlns:mc="http://schemas.openxmlformats.org/markup-compatibility/2006" xmlns:a14="http://schemas.microsoft.com/office/drawing/2010/main">
+          <mc:Choice Requires="a14">
             <p:sp>
               <p:nvSpPr>
                 <p:cNvPr id="8" name="TextBox 7">
@@ -19637,7 +19583,7 @@
               </p:txBody>
             </p:sp>
           </mc:Choice>
-          <mc:Fallback>
+          <mc:Fallback xmlns="">
             <p:sp>
               <p:nvSpPr>
                 <p:cNvPr id="8" name="TextBox 7">

</xml_diff>